<commit_message>
lab 2 and lab 3
</commit_message>
<xml_diff>
--- a/Lab_1/_1._intro.pptx
+++ b/Lab_1/_1._intro.pptx
@@ -8,7 +8,7 @@
     <p:notesMasterId r:id="rId5"/>
   </p:notesMasterIdLst>
   <p:sldIdLst>
-    <p:sldId id="269" r:id="rId2"/>
+    <p:sldId id="270" r:id="rId2"/>
     <p:sldId id="261" r:id="rId3"/>
     <p:sldId id="268" r:id="rId4"/>
   </p:sldIdLst>
@@ -199,7 +199,7 @@
           <a:p>
             <a:fld id="{7631E45C-F116-462B-8760-2078BF082F1A}" type="datetimeFigureOut">
               <a:rPr lang="ru-RU" smtClean="0"/>
-              <a:t>23.02.2024</a:t>
+              <a:t>08.03.2024</a:t>
             </a:fld>
             <a:endParaRPr lang="ru-RU"/>
           </a:p>
@@ -613,7 +613,7 @@
           <a:p>
             <a:fld id="{A9AD3FF1-1C77-4208-A728-6715B8BCAEC8}" type="datetime1">
               <a:rPr lang="ru-RU" smtClean="0"/>
-              <a:t>23.02.2024</a:t>
+              <a:t>08.03.2024</a:t>
             </a:fld>
             <a:endParaRPr lang="ru-RU"/>
           </a:p>
@@ -811,7 +811,7 @@
           <a:p>
             <a:fld id="{1C142B9A-2E56-4B99-A87C-1793C4E37C39}" type="datetime1">
               <a:rPr lang="ru-RU" smtClean="0"/>
-              <a:t>23.02.2024</a:t>
+              <a:t>08.03.2024</a:t>
             </a:fld>
             <a:endParaRPr lang="ru-RU"/>
           </a:p>
@@ -1019,7 +1019,7 @@
           <a:p>
             <a:fld id="{9E0ED007-B469-42B5-84D0-B2D8518EE6AF}" type="datetime1">
               <a:rPr lang="ru-RU" smtClean="0"/>
-              <a:t>23.02.2024</a:t>
+              <a:t>08.03.2024</a:t>
             </a:fld>
             <a:endParaRPr lang="ru-RU"/>
           </a:p>
@@ -1217,7 +1217,7 @@
           <a:p>
             <a:fld id="{C24A6B21-3CC2-4411-9ED7-28D4F07E6447}" type="datetime1">
               <a:rPr lang="ru-RU" smtClean="0"/>
-              <a:t>23.02.2024</a:t>
+              <a:t>08.03.2024</a:t>
             </a:fld>
             <a:endParaRPr lang="ru-RU"/>
           </a:p>
@@ -1492,7 +1492,7 @@
           <a:p>
             <a:fld id="{B56534DB-51AD-42E8-BAE2-9D524DF6969E}" type="datetime1">
               <a:rPr lang="ru-RU" smtClean="0"/>
-              <a:t>23.02.2024</a:t>
+              <a:t>08.03.2024</a:t>
             </a:fld>
             <a:endParaRPr lang="ru-RU"/>
           </a:p>
@@ -1757,7 +1757,7 @@
           <a:p>
             <a:fld id="{586E71E7-4231-4511-A286-4D8BAA3C5460}" type="datetime1">
               <a:rPr lang="ru-RU" smtClean="0"/>
-              <a:t>23.02.2024</a:t>
+              <a:t>08.03.2024</a:t>
             </a:fld>
             <a:endParaRPr lang="ru-RU"/>
           </a:p>
@@ -2169,7 +2169,7 @@
           <a:p>
             <a:fld id="{38907D2B-A495-4440-AD73-F377A1E57184}" type="datetime1">
               <a:rPr lang="ru-RU" smtClean="0"/>
-              <a:t>23.02.2024</a:t>
+              <a:t>08.03.2024</a:t>
             </a:fld>
             <a:endParaRPr lang="ru-RU"/>
           </a:p>
@@ -2310,7 +2310,7 @@
           <a:p>
             <a:fld id="{161FC52B-1D54-47AE-B2C9-575E5C19FE39}" type="datetime1">
               <a:rPr lang="ru-RU" smtClean="0"/>
-              <a:t>23.02.2024</a:t>
+              <a:t>08.03.2024</a:t>
             </a:fld>
             <a:endParaRPr lang="ru-RU"/>
           </a:p>
@@ -2423,7 +2423,7 @@
           <a:p>
             <a:fld id="{8832FC10-F7B7-4864-9033-3EC7976FDCB5}" type="datetime1">
               <a:rPr lang="ru-RU" smtClean="0"/>
-              <a:t>23.02.2024</a:t>
+              <a:t>08.03.2024</a:t>
             </a:fld>
             <a:endParaRPr lang="ru-RU"/>
           </a:p>
@@ -2734,7 +2734,7 @@
           <a:p>
             <a:fld id="{4C6FDB09-C334-42D1-A8CC-92BA43584AF5}" type="datetime1">
               <a:rPr lang="ru-RU" smtClean="0"/>
-              <a:t>23.02.2024</a:t>
+              <a:t>08.03.2024</a:t>
             </a:fld>
             <a:endParaRPr lang="ru-RU"/>
           </a:p>
@@ -3022,7 +3022,7 @@
           <a:p>
             <a:fld id="{5DA449B0-4AC4-4D56-AD1E-2E60E920D68F}" type="datetime1">
               <a:rPr lang="ru-RU" smtClean="0"/>
-              <a:t>23.02.2024</a:t>
+              <a:t>08.03.2024</a:t>
             </a:fld>
             <a:endParaRPr lang="ru-RU"/>
           </a:p>
@@ -3263,7 +3263,7 @@
           <a:p>
             <a:fld id="{6E39FA31-E67D-4DB0-8FD3-FD47DE2B0D1A}" type="datetime1">
               <a:rPr lang="ru-RU" smtClean="0"/>
-              <a:t>23.02.2024</a:t>
+              <a:t>08.03.2024</a:t>
             </a:fld>
             <a:endParaRPr lang="ru-RU"/>
           </a:p>
@@ -3696,14 +3696,14 @@
           <p:nvPr>
             <p:extLst>
               <p:ext uri="{D42A27DB-BD31-4B8C-83A1-F6EECF244321}">
-                <p14:modId xmlns:p14="http://schemas.microsoft.com/office/powerpoint/2010/main" val="2741532024"/>
+                <p14:modId xmlns:p14="http://schemas.microsoft.com/office/powerpoint/2010/main" val="1907090127"/>
               </p:ext>
             </p:extLst>
           </p:nvPr>
         </p:nvGraphicFramePr>
         <p:xfrm>
           <a:off x="636363" y="531665"/>
-          <a:ext cx="3632324" cy="5718298"/>
+          <a:ext cx="3632324" cy="5697816"/>
         </p:xfrm>
         <a:graphic>
           <a:graphicData uri="http://schemas.openxmlformats.org/drawingml/2006/table">
@@ -3773,9 +3773,7 @@
                       <a:r>
                         <a:rPr lang="ru-RU" dirty="0">
                           <a:solidFill>
-                            <a:schemeClr val="bg1">
-                              <a:lumMod val="65000"/>
-                            </a:schemeClr>
+                            <a:schemeClr val="tx1"/>
                           </a:solidFill>
                         </a:rPr>
                         <a:t>22</a:t>
@@ -3783,9 +3781,7 @@
                       <a:r>
                         <a:rPr lang="en-US" dirty="0">
                           <a:solidFill>
-                            <a:schemeClr val="bg1">
-                              <a:lumMod val="65000"/>
-                            </a:schemeClr>
+                            <a:schemeClr val="tx1"/>
                           </a:solidFill>
                         </a:rPr>
                         <a:t>/02/24</a:t>
@@ -3802,9 +3798,7 @@
                       <a:r>
                         <a:rPr lang="ru-RU" sz="1200" dirty="0">
                           <a:solidFill>
-                            <a:schemeClr val="bg1">
-                              <a:lumMod val="65000"/>
-                            </a:schemeClr>
+                            <a:schemeClr val="tx1"/>
                           </a:solidFill>
                           <a:effectLst/>
                         </a:rPr>
@@ -3813,9 +3807,7 @@
                       <a:r>
                         <a:rPr lang="en-US" sz="1200" dirty="0">
                           <a:solidFill>
-                            <a:schemeClr val="bg1">
-                              <a:lumMod val="65000"/>
-                            </a:schemeClr>
+                            <a:schemeClr val="tx1"/>
                           </a:solidFill>
                           <a:effectLst/>
                         </a:rPr>
@@ -3824,9 +3816,7 @@
                       <a:r>
                         <a:rPr lang="ru-RU" sz="1200" dirty="0">
                           <a:solidFill>
-                            <a:schemeClr val="bg1">
-                              <a:lumMod val="65000"/>
-                            </a:schemeClr>
+                            <a:schemeClr val="tx1"/>
                           </a:solidFill>
                           <a:effectLst/>
                         </a:rPr>
@@ -3834,9 +3824,7 @@
                       </a:r>
                       <a:endParaRPr lang="en-US" sz="1200" dirty="0">
                         <a:solidFill>
-                          <a:schemeClr val="bg1">
-                            <a:lumMod val="65000"/>
-                          </a:schemeClr>
+                          <a:schemeClr val="tx1"/>
                         </a:solidFill>
                       </a:endParaRPr>
                     </a:p>
@@ -3858,12 +3846,16 @@
                       <a:r>
                         <a:rPr lang="en-US" sz="1400" b="0" strike="noStrike" spc="-1" dirty="0">
                           <a:solidFill>
-                            <a:srgbClr val="000000"/>
+                            <a:schemeClr val="tx1"/>
                           </a:solidFill>
                         </a:rPr>
                         <a:t>29/02/24</a:t>
                       </a:r>
-                      <a:endParaRPr lang="en-US" dirty="0"/>
+                      <a:endParaRPr lang="en-US" dirty="0">
+                        <a:solidFill>
+                          <a:schemeClr val="tx1"/>
+                        </a:solidFill>
+                      </a:endParaRPr>
                     </a:p>
                   </a:txBody>
                   <a:tcPr/>
@@ -3875,11 +3867,18 @@
                     <a:p>
                       <a:r>
                         <a:rPr lang="ru-RU" sz="1200" dirty="0">
+                          <a:solidFill>
+                            <a:schemeClr val="tx1"/>
+                          </a:solidFill>
                           <a:effectLst/>
                         </a:rPr>
                         <a:t>Циклы, условия.</a:t>
                       </a:r>
-                      <a:endParaRPr lang="en-US" sz="1200" dirty="0"/>
+                      <a:endParaRPr lang="en-US" sz="1200" dirty="0">
+                        <a:solidFill>
+                          <a:schemeClr val="tx1"/>
+                        </a:solidFill>
+                      </a:endParaRPr>
                     </a:p>
                   </a:txBody>
                   <a:tcPr/>
@@ -3997,10 +3996,10 @@
                     <a:lstStyle/>
                     <a:p>
                       <a:r>
-                        <a:rPr lang="ru-RU" sz="1200">
+                        <a:rPr lang="ru-RU" sz="1200" dirty="0">
                           <a:effectLst/>
                         </a:rPr>
-                        <a:t>Указатели. Передача/возврат значений в функции.</a:t>
+                        <a:t>Указатели. Динамическая память.</a:t>
                       </a:r>
                       <a:endParaRPr lang="en-US" sz="1200" dirty="0"/>
                     </a:p>
@@ -4037,11 +4036,28 @@
                     <a:bodyPr/>
                     <a:lstStyle/>
                     <a:p>
+                      <a:pPr marL="0" marR="0" lvl="0" indent="0" algn="l" defTabSz="685800" rtl="0" eaLnBrk="1" fontAlgn="auto" latinLnBrk="0" hangingPunct="1">
+                        <a:lnSpc>
+                          <a:spcPct val="100000"/>
+                        </a:lnSpc>
+                        <a:spcBef>
+                          <a:spcPts val="0"/>
+                        </a:spcBef>
+                        <a:spcAft>
+                          <a:spcPts val="0"/>
+                        </a:spcAft>
+                        <a:buClrTx/>
+                        <a:buSzTx/>
+                        <a:buFontTx/>
+                        <a:buNone/>
+                        <a:tabLst/>
+                        <a:defRPr/>
+                      </a:pPr>
                       <a:r>
                         <a:rPr lang="ru-RU" sz="1200" dirty="0">
                           <a:effectLst/>
                         </a:rPr>
-                        <a:t>Динамическая память. Списки.</a:t>
+                        <a:t>Классы. Конструктор, деструктор.</a:t>
                       </a:r>
                       <a:endParaRPr lang="en-US" sz="1200" dirty="0"/>
                     </a:p>
@@ -4078,11 +4094,28 @@
                     <a:bodyPr/>
                     <a:lstStyle/>
                     <a:p>
+                      <a:pPr marL="0" marR="0" lvl="0" indent="0" algn="l" defTabSz="685800" rtl="0" eaLnBrk="1" fontAlgn="auto" latinLnBrk="0" hangingPunct="1">
+                        <a:lnSpc>
+                          <a:spcPct val="100000"/>
+                        </a:lnSpc>
+                        <a:spcBef>
+                          <a:spcPts val="0"/>
+                        </a:spcBef>
+                        <a:spcAft>
+                          <a:spcPts val="0"/>
+                        </a:spcAft>
+                        <a:buClrTx/>
+                        <a:buSzTx/>
+                        <a:buFontTx/>
+                        <a:buNone/>
+                        <a:tabLst/>
+                        <a:defRPr/>
+                      </a:pPr>
                       <a:r>
                         <a:rPr lang="ru-RU" sz="1200" dirty="0">
                           <a:effectLst/>
                         </a:rPr>
-                        <a:t>Чтение/запись файлов.</a:t>
+                        <a:t>Списки.</a:t>
                       </a:r>
                       <a:endParaRPr lang="en-US" sz="1200" dirty="0"/>
                     </a:p>
@@ -4119,11 +4152,34 @@
                     <a:bodyPr/>
                     <a:lstStyle/>
                     <a:p>
+                      <a:pPr marL="0" marR="0" lvl="0" indent="0" algn="l" defTabSz="685800" rtl="0" eaLnBrk="1" fontAlgn="auto" latinLnBrk="0" hangingPunct="1">
+                        <a:lnSpc>
+                          <a:spcPct val="100000"/>
+                        </a:lnSpc>
+                        <a:spcBef>
+                          <a:spcPts val="0"/>
+                        </a:spcBef>
+                        <a:spcAft>
+                          <a:spcPts val="0"/>
+                        </a:spcAft>
+                        <a:buClrTx/>
+                        <a:buSzTx/>
+                        <a:buFontTx/>
+                        <a:buNone/>
+                        <a:tabLst/>
+                        <a:defRPr/>
+                      </a:pPr>
                       <a:r>
                         <a:rPr lang="ru-RU" sz="1200" dirty="0">
                           <a:effectLst/>
                         </a:rPr>
-                        <a:t>Классы. Конструктор, деструктор.</a:t>
+                        <a:t>Чтение/запись файлов</a:t>
+                      </a:r>
+                      <a:r>
+                        <a:rPr lang="en-US" sz="1200" dirty="0">
+                          <a:effectLst/>
+                        </a:rPr>
+                        <a:t>.</a:t>
                       </a:r>
                       <a:endParaRPr lang="en-US" sz="1200" dirty="0"/>
                     </a:p>
@@ -4301,14 +4357,14 @@
           <p:nvPr>
             <p:extLst>
               <p:ext uri="{D42A27DB-BD31-4B8C-83A1-F6EECF244321}">
-                <p14:modId xmlns:p14="http://schemas.microsoft.com/office/powerpoint/2010/main" val="248031243"/>
+                <p14:modId xmlns:p14="http://schemas.microsoft.com/office/powerpoint/2010/main" val="1829325380"/>
               </p:ext>
             </p:extLst>
           </p:nvPr>
         </p:nvGraphicFramePr>
         <p:xfrm>
           <a:off x="4807662" y="531665"/>
-          <a:ext cx="3632324" cy="5738780"/>
+          <a:ext cx="3632324" cy="5697816"/>
         </p:xfrm>
         <a:graphic>
           <a:graphicData uri="http://schemas.openxmlformats.org/drawingml/2006/table">
@@ -4421,12 +4477,16 @@
                       <a:r>
                         <a:rPr lang="en-US" sz="1400" b="0" strike="noStrike" spc="-1" dirty="0">
                           <a:solidFill>
-                            <a:srgbClr val="000000"/>
+                            <a:schemeClr val="tx1"/>
                           </a:solidFill>
                         </a:rPr>
                         <a:t>01/03/24</a:t>
                       </a:r>
-                      <a:endParaRPr lang="en-US" dirty="0"/>
+                      <a:endParaRPr lang="en-US" dirty="0">
+                        <a:solidFill>
+                          <a:schemeClr val="tx1"/>
+                        </a:solidFill>
+                      </a:endParaRPr>
                     </a:p>
                   </a:txBody>
                   <a:tcPr/>
@@ -4455,11 +4515,18 @@
                       </a:pPr>
                       <a:r>
                         <a:rPr lang="ru-RU" sz="1200" dirty="0">
+                          <a:solidFill>
+                            <a:schemeClr val="tx1"/>
+                          </a:solidFill>
                           <a:effectLst/>
                         </a:rPr>
                         <a:t>Типы данных, массивы. Ввод/вывод в консоль. Циклы, условия.</a:t>
                       </a:r>
-                      <a:endParaRPr lang="en-US" sz="1200" dirty="0"/>
+                      <a:endParaRPr lang="en-US" sz="1200" dirty="0">
+                        <a:solidFill>
+                          <a:schemeClr val="tx1"/>
+                        </a:solidFill>
+                      </a:endParaRPr>
                     </a:p>
                   </a:txBody>
                   <a:tcPr/>
@@ -4658,7 +4725,13 @@
                         <a:rPr lang="ru-RU" sz="1200" dirty="0">
                           <a:effectLst/>
                         </a:rPr>
-                        <a:t>Указатели. Передача/возврат значений в функции.</a:t>
+                        <a:t>Указатели. Динамическая память</a:t>
+                      </a:r>
+                      <a:r>
+                        <a:rPr lang="en-US" sz="1200" dirty="0">
+                          <a:effectLst/>
+                        </a:rPr>
+                        <a:t>.</a:t>
                       </a:r>
                       <a:endParaRPr lang="en-US" sz="1200" dirty="0"/>
                     </a:p>
@@ -4716,7 +4789,7 @@
                         <a:rPr lang="ru-RU" sz="1200" dirty="0">
                           <a:effectLst/>
                         </a:rPr>
-                        <a:t>Динамическая память. Списки.</a:t>
+                        <a:t>Классы. Конструктор, деструктор.</a:t>
                       </a:r>
                       <a:endParaRPr lang="en-US" sz="1200" dirty="0"/>
                     </a:p>
@@ -4774,7 +4847,7 @@
                         <a:rPr lang="ru-RU" sz="1200" dirty="0">
                           <a:effectLst/>
                         </a:rPr>
-                        <a:t>Чтение/запись файлов.</a:t>
+                        <a:t>Списки.</a:t>
                       </a:r>
                       <a:endParaRPr lang="en-US" sz="1200" dirty="0"/>
                     </a:p>
@@ -4832,11 +4905,8 @@
                         <a:rPr lang="ru-RU" sz="1200" dirty="0">
                           <a:effectLst/>
                         </a:rPr>
-                        <a:t>Классы. Конструктор, деструктор.</a:t>
-                      </a:r>
-                      <a:endParaRPr lang="en-US" sz="1200" dirty="0"/>
-                    </a:p>
-                    <a:p>
+                        <a:t>Чтение/запись файлов.</a:t>
+                      </a:r>
                       <a:endParaRPr lang="en-US" sz="1200" dirty="0"/>
                     </a:p>
                   </a:txBody>
@@ -4966,7 +5036,7 @@
     </p:spTree>
     <p:extLst>
       <p:ext uri="{BB962C8B-B14F-4D97-AF65-F5344CB8AC3E}">
-        <p14:creationId xmlns:p14="http://schemas.microsoft.com/office/powerpoint/2010/main" val="3416004993"/>
+        <p14:creationId xmlns:p14="http://schemas.microsoft.com/office/powerpoint/2010/main" val="172183156"/>
       </p:ext>
     </p:extLst>
   </p:cSld>

</xml_diff>